<commit_message>
new change in dev
</commit_message>
<xml_diff>
--- a/PptForGit.pptx
+++ b/PptForGit.pptx
@@ -3370,13 +3370,16 @@
           <a:p>
             <a:r>
               <a:rPr lang="en-IN" dirty="0"/>
-              <a:t>In </a:t>
+              <a:t>New </a:t>
             </a:r>
             <a:r>
               <a:rPr lang="en-IN"/>
+              <a:t>change in </a:t>
+            </a:r>
+            <a:r>
+              <a:rPr lang="en-IN" dirty="0"/>
               <a:t>dev branch</a:t>
             </a:r>
-            <a:endParaRPr lang="en-IN" dirty="0"/>
           </a:p>
         </p:txBody>
       </p:sp>

</xml_diff>

<commit_message>
updated ppt with auther and email updates made
</commit_message>
<xml_diff>
--- a/PptForGit.pptx
+++ b/PptForGit.pptx
@@ -3404,7 +3404,14 @@
           <a:bodyPr/>
           <a:lstStyle/>
           <a:p>
-            <a:endParaRPr lang="en-IN"/>
+            <a:r>
+              <a:rPr lang="en-IN" dirty="0"/>
+              <a:t>Author name </a:t>
+            </a:r>
+            <a:r>
+              <a:rPr lang="en-IN"/>
+              <a:t>Vidit Tayal</a:t>
+            </a:r>
           </a:p>
         </p:txBody>
       </p:sp>

</xml_diff>